<commit_message>
#10 #8 #4 #5 #7 #2
</commit_message>
<xml_diff>
--- a/Presentation1.pptx
+++ b/Presentation1.pptx
@@ -4082,14 +4082,14 @@
           <p:nvPr>
             <p:extLst>
               <p:ext uri="{D42A27DB-BD31-4B8C-83A1-F6EECF244321}">
-                <p14:modId xmlns:p14="http://schemas.microsoft.com/office/powerpoint/2010/main" val="3958020848"/>
+                <p14:modId xmlns:p14="http://schemas.microsoft.com/office/powerpoint/2010/main" val="972923280"/>
               </p:ext>
             </p:extLst>
           </p:nvPr>
         </p:nvGraphicFramePr>
         <p:xfrm>
           <a:off x="3719996" y="2316480"/>
-          <a:ext cx="2860914" cy="2225040"/>
+          <a:ext cx="2860914" cy="1920240"/>
         </p:xfrm>
         <a:graphic>
           <a:graphicData uri="http://schemas.openxmlformats.org/drawingml/2006/table">
@@ -4142,16 +4142,6 @@
                       <a:r>
                         <a:rPr lang="en-US" sz="2000" b="0" dirty="0"/>
                         <a:t>: string</a:t>
-                      </a:r>
-                    </a:p>
-                    <a:p>
-                      <a:pPr marL="342900" indent="-342900">
-                        <a:buFontTx/>
-                        <a:buChar char="-"/>
-                      </a:pPr>
-                      <a:r>
-                        <a:rPr lang="en-US" sz="2000" b="0" dirty="0"/>
-                        <a:t>gender :Gender </a:t>
                       </a:r>
                     </a:p>
                     <a:p>
@@ -5921,7 +5911,7 @@
           <a:p>
             <a:r>
               <a:rPr lang="en-US" dirty="0"/>
-              <a:t>2</a:t>
+              <a:t>*</a:t>
             </a:r>
           </a:p>
         </p:txBody>
@@ -5976,7 +5966,7 @@
         <p:spPr>
           <a:xfrm>
             <a:off x="10291467" y="1624703"/>
-            <a:ext cx="301686" cy="369332"/>
+            <a:ext cx="300082" cy="369332"/>
           </a:xfrm>
           <a:prstGeom prst="rect">
             <a:avLst/>
@@ -5991,7 +5981,7 @@
           <a:p>
             <a:r>
               <a:rPr lang="en-US" dirty="0"/>
-              <a:t>2</a:t>
+              <a:t>*</a:t>
             </a:r>
           </a:p>
         </p:txBody>
@@ -6026,7 +6016,7 @@
           <a:p>
             <a:r>
               <a:rPr lang="en-US" dirty="0"/>
-              <a:t>5</a:t>
+              <a:t>*</a:t>
             </a:r>
           </a:p>
         </p:txBody>
@@ -6097,7 +6087,7 @@
           <a:p>
             <a:r>
               <a:rPr lang="en-US" dirty="0"/>
-              <a:t>3</a:t>
+              <a:t>*</a:t>
             </a:r>
           </a:p>
         </p:txBody>

</xml_diff>